<commit_message>
Added Lecture 6 Non-Linear Equations
</commit_message>
<xml_diff>
--- a/slides/Lecture5-01-30-23-LinearAlgebra-2.pptx
+++ b/slides/Lecture5-01-30-23-LinearAlgebra-2.pptx
@@ -257,7 +257,7 @@
           <a:p>
             <a:fld id="{961AF02B-09B0-4980-983D-27C0EDB561B5}" type="datetimeFigureOut">
               <a:rPr lang="uk-UA" smtClean="0"/>
-              <a:t>30.01.25</a:t>
+              <a:t>03.02.25</a:t>
             </a:fld>
             <a:endParaRPr lang="uk-UA"/>
           </a:p>
@@ -5681,56 +5681,6 @@
       </p:pic>
       <p:sp>
         <p:nvSpPr>
-          <p:cNvPr id="9" name="TextBox 8">
-            <a:extLst>
-              <a:ext uri="{FF2B5EF4-FFF2-40B4-BE49-F238E27FC236}">
-                <a16:creationId xmlns:a16="http://schemas.microsoft.com/office/drawing/2014/main" id="{4ADF7582-D44D-F927-860D-231B612B2A3A}"/>
-              </a:ext>
-            </a:extLst>
-          </p:cNvPr>
-          <p:cNvSpPr txBox="1"/>
-          <p:nvPr/>
-        </p:nvSpPr>
-        <p:spPr>
-          <a:xfrm>
-            <a:off x="325785" y="6337559"/>
-            <a:ext cx="10786853" cy="369332"/>
-          </a:xfrm>
-          <a:prstGeom prst="rect">
-            <a:avLst/>
-          </a:prstGeom>
-          <a:noFill/>
-        </p:spPr>
-        <p:txBody>
-          <a:bodyPr wrap="square">
-            <a:spAutoFit/>
-          </a:bodyPr>
-          <a:lstStyle/>
-          <a:p>
-            <a:r>
-              <a:rPr lang="en-US" b="1" dirty="0">
-                <a:latin typeface="LM Sans 10" panose="00000500000000000000" pitchFamily="50" charset="0"/>
-              </a:rPr>
-              <a:t>Course materials:</a:t>
-            </a:r>
-            <a:r>
-              <a:rPr lang="en-US" dirty="0">
-                <a:latin typeface="LM Sans 10" panose="00000500000000000000" pitchFamily="50" charset="0"/>
-              </a:rPr>
-              <a:t> </a:t>
-            </a:r>
-            <a:r>
-              <a:rPr lang="en-US" dirty="0">
-                <a:hlinkClick r:id="rId5"/>
-              </a:rPr>
-              <a:t>https://github.com/vlvovch/PHYS6350-ComputationalPhysics</a:t>
-            </a:r>
-            <a:endParaRPr lang="en-US" dirty="0"/>
-          </a:p>
-        </p:txBody>
-      </p:sp>
-      <p:sp>
-        <p:nvSpPr>
           <p:cNvPr id="3" name="TextBox 2">
             <a:extLst>
               <a:ext uri="{FF2B5EF4-FFF2-40B4-BE49-F238E27FC236}">
@@ -5826,6 +5776,56 @@
             <a:endParaRPr lang="en-US" sz="2200" dirty="0">
               <a:latin typeface="+mj-lt"/>
             </a:endParaRPr>
+          </a:p>
+        </p:txBody>
+      </p:sp>
+      <p:sp>
+        <p:nvSpPr>
+          <p:cNvPr id="2" name="TextBox 1">
+            <a:extLst>
+              <a:ext uri="{FF2B5EF4-FFF2-40B4-BE49-F238E27FC236}">
+                <a16:creationId xmlns:a16="http://schemas.microsoft.com/office/drawing/2014/main" id="{F198F191-C820-66C8-3F8E-C42F9147D979}"/>
+              </a:ext>
+            </a:extLst>
+          </p:cNvPr>
+          <p:cNvSpPr txBox="1"/>
+          <p:nvPr/>
+        </p:nvSpPr>
+        <p:spPr>
+          <a:xfrm>
+            <a:off x="325785" y="6337559"/>
+            <a:ext cx="10786853" cy="369332"/>
+          </a:xfrm>
+          <a:prstGeom prst="rect">
+            <a:avLst/>
+          </a:prstGeom>
+          <a:noFill/>
+        </p:spPr>
+        <p:txBody>
+          <a:bodyPr wrap="square">
+            <a:spAutoFit/>
+          </a:bodyPr>
+          <a:lstStyle/>
+          <a:p>
+            <a:r>
+              <a:rPr lang="en-US" b="1" dirty="0">
+                <a:latin typeface="LM Sans 10" panose="00000500000000000000" pitchFamily="50" charset="0"/>
+              </a:rPr>
+              <a:t>Course materials:</a:t>
+            </a:r>
+            <a:r>
+              <a:rPr lang="en-US" dirty="0">
+                <a:latin typeface="LM Sans 10" panose="00000500000000000000" pitchFamily="50" charset="0"/>
+              </a:rPr>
+              <a:t> </a:t>
+            </a:r>
+            <a:r>
+              <a:rPr lang="en-US" dirty="0">
+                <a:hlinkClick r:id="rId5"/>
+              </a:rPr>
+              <a:t>https://github.com/vlvovch/PHYS6350-ComputationalPhysics/tree/spring2025</a:t>
+            </a:r>
+            <a:endParaRPr lang="en-US" dirty="0"/>
           </a:p>
         </p:txBody>
       </p:sp>
@@ -7263,8 +7263,8 @@
           </a:p>
         </p:txBody>
       </p:sp>
-      <mc:AlternateContent xmlns:mc="http://schemas.openxmlformats.org/markup-compatibility/2006">
-        <mc:Choice xmlns:a14="http://schemas.microsoft.com/office/drawing/2010/main" Requires="a14">
+      <mc:AlternateContent xmlns:mc="http://schemas.openxmlformats.org/markup-compatibility/2006" xmlns:a14="http://schemas.microsoft.com/office/drawing/2010/main">
+        <mc:Choice Requires="a14">
           <p:sp>
             <p:nvSpPr>
               <p:cNvPr id="5" name="TextBox 4">
@@ -7293,6 +7293,7 @@
               </a:bodyPr>
               <a:lstStyle/>
               <a:p>
+                <a:pPr/>
                 <a14:m>
                   <m:oMathPara xmlns:m="http://schemas.openxmlformats.org/officeDocument/2006/math">
                     <m:oMathParaPr>
@@ -7395,7 +7396,7 @@
             </p:txBody>
           </p:sp>
         </mc:Choice>
-        <mc:Fallback>
+        <mc:Fallback xmlns="">
           <p:sp>
             <p:nvSpPr>
               <p:cNvPr id="5" name="TextBox 4">

</xml_diff>